<commit_message>
作业+fftshift ok and lowpass need debug
</commit_message>
<xml_diff>
--- a/图像处理流程图.pptx
+++ b/图像处理流程图.pptx
@@ -260,7 +260,7 @@
           <a:p>
             <a:fld id="{648AE971-6591-4C67-8226-CECCFE0F746A}" type="datetimeFigureOut">
               <a:rPr lang="zh-CN" altLang="en-US" smtClean="0"/>
-              <a:t>2018/11/25</a:t>
+              <a:t>2018/12/6</a:t>
             </a:fld>
             <a:endParaRPr lang="zh-CN" altLang="en-US"/>
           </a:p>
@@ -458,7 +458,7 @@
           <a:p>
             <a:fld id="{648AE971-6591-4C67-8226-CECCFE0F746A}" type="datetimeFigureOut">
               <a:rPr lang="zh-CN" altLang="en-US" smtClean="0"/>
-              <a:t>2018/11/25</a:t>
+              <a:t>2018/12/6</a:t>
             </a:fld>
             <a:endParaRPr lang="zh-CN" altLang="en-US"/>
           </a:p>
@@ -666,7 +666,7 @@
           <a:p>
             <a:fld id="{648AE971-6591-4C67-8226-CECCFE0F746A}" type="datetimeFigureOut">
               <a:rPr lang="zh-CN" altLang="en-US" smtClean="0"/>
-              <a:t>2018/11/25</a:t>
+              <a:t>2018/12/6</a:t>
             </a:fld>
             <a:endParaRPr lang="zh-CN" altLang="en-US"/>
           </a:p>
@@ -864,7 +864,7 @@
           <a:p>
             <a:fld id="{648AE971-6591-4C67-8226-CECCFE0F746A}" type="datetimeFigureOut">
               <a:rPr lang="zh-CN" altLang="en-US" smtClean="0"/>
-              <a:t>2018/11/25</a:t>
+              <a:t>2018/12/6</a:t>
             </a:fld>
             <a:endParaRPr lang="zh-CN" altLang="en-US"/>
           </a:p>
@@ -1139,7 +1139,7 @@
           <a:p>
             <a:fld id="{648AE971-6591-4C67-8226-CECCFE0F746A}" type="datetimeFigureOut">
               <a:rPr lang="zh-CN" altLang="en-US" smtClean="0"/>
-              <a:t>2018/11/25</a:t>
+              <a:t>2018/12/6</a:t>
             </a:fld>
             <a:endParaRPr lang="zh-CN" altLang="en-US"/>
           </a:p>
@@ -1404,7 +1404,7 @@
           <a:p>
             <a:fld id="{648AE971-6591-4C67-8226-CECCFE0F746A}" type="datetimeFigureOut">
               <a:rPr lang="zh-CN" altLang="en-US" smtClean="0"/>
-              <a:t>2018/11/25</a:t>
+              <a:t>2018/12/6</a:t>
             </a:fld>
             <a:endParaRPr lang="zh-CN" altLang="en-US"/>
           </a:p>
@@ -1816,7 +1816,7 @@
           <a:p>
             <a:fld id="{648AE971-6591-4C67-8226-CECCFE0F746A}" type="datetimeFigureOut">
               <a:rPr lang="zh-CN" altLang="en-US" smtClean="0"/>
-              <a:t>2018/11/25</a:t>
+              <a:t>2018/12/6</a:t>
             </a:fld>
             <a:endParaRPr lang="zh-CN" altLang="en-US"/>
           </a:p>
@@ -1957,7 +1957,7 @@
           <a:p>
             <a:fld id="{648AE971-6591-4C67-8226-CECCFE0F746A}" type="datetimeFigureOut">
               <a:rPr lang="zh-CN" altLang="en-US" smtClean="0"/>
-              <a:t>2018/11/25</a:t>
+              <a:t>2018/12/6</a:t>
             </a:fld>
             <a:endParaRPr lang="zh-CN" altLang="en-US"/>
           </a:p>
@@ -2070,7 +2070,7 @@
           <a:p>
             <a:fld id="{648AE971-6591-4C67-8226-CECCFE0F746A}" type="datetimeFigureOut">
               <a:rPr lang="zh-CN" altLang="en-US" smtClean="0"/>
-              <a:t>2018/11/25</a:t>
+              <a:t>2018/12/6</a:t>
             </a:fld>
             <a:endParaRPr lang="zh-CN" altLang="en-US"/>
           </a:p>
@@ -2381,7 +2381,7 @@
           <a:p>
             <a:fld id="{648AE971-6591-4C67-8226-CECCFE0F746A}" type="datetimeFigureOut">
               <a:rPr lang="zh-CN" altLang="en-US" smtClean="0"/>
-              <a:t>2018/11/25</a:t>
+              <a:t>2018/12/6</a:t>
             </a:fld>
             <a:endParaRPr lang="zh-CN" altLang="en-US"/>
           </a:p>
@@ -2669,7 +2669,7 @@
           <a:p>
             <a:fld id="{648AE971-6591-4C67-8226-CECCFE0F746A}" type="datetimeFigureOut">
               <a:rPr lang="zh-CN" altLang="en-US" smtClean="0"/>
-              <a:t>2018/11/25</a:t>
+              <a:t>2018/12/6</a:t>
             </a:fld>
             <a:endParaRPr lang="zh-CN" altLang="en-US"/>
           </a:p>
@@ -2910,7 +2910,7 @@
           <a:p>
             <a:fld id="{648AE971-6591-4C67-8226-CECCFE0F746A}" type="datetimeFigureOut">
               <a:rPr lang="zh-CN" altLang="en-US" smtClean="0"/>
-              <a:t>2018/11/25</a:t>
+              <a:t>2018/12/6</a:t>
             </a:fld>
             <a:endParaRPr lang="zh-CN" altLang="en-US"/>
           </a:p>
@@ -5089,497 +5089,6 @@
           <a:chExt cx="0" cy="0"/>
         </a:xfrm>
       </p:grpSpPr>
-      <p:sp>
-        <p:nvSpPr>
-          <p:cNvPr id="7" name="矩形 6">
-            <a:extLst>
-              <a:ext uri="{FF2B5EF4-FFF2-40B4-BE49-F238E27FC236}">
-                <a16:creationId xmlns:a16="http://schemas.microsoft.com/office/drawing/2014/main" id="{EA4331C4-354E-4444-9C0C-7B138CB50027}"/>
-              </a:ext>
-            </a:extLst>
-          </p:cNvPr>
-          <p:cNvSpPr/>
-          <p:nvPr/>
-        </p:nvSpPr>
-        <p:spPr>
-          <a:xfrm>
-            <a:off x="6598764" y="1378672"/>
-            <a:ext cx="2479250" cy="857839"/>
-          </a:xfrm>
-          <a:prstGeom prst="rect">
-            <a:avLst/>
-          </a:prstGeom>
-          <a:noFill/>
-          <a:ln w="28575">
-            <a:solidFill>
-              <a:schemeClr val="tx1"/>
-            </a:solidFill>
-          </a:ln>
-        </p:spPr>
-        <p:style>
-          <a:lnRef idx="2">
-            <a:schemeClr val="accent1">
-              <a:shade val="50000"/>
-            </a:schemeClr>
-          </a:lnRef>
-          <a:fillRef idx="1">
-            <a:schemeClr val="accent1"/>
-          </a:fillRef>
-          <a:effectRef idx="0">
-            <a:schemeClr val="accent1"/>
-          </a:effectRef>
-          <a:fontRef idx="minor">
-            <a:schemeClr val="lt1"/>
-          </a:fontRef>
-        </p:style>
-        <p:txBody>
-          <a:bodyPr rtlCol="0" anchor="ctr"/>
-          <a:lstStyle/>
-          <a:p>
-            <a:pPr algn="ctr"/>
-            <a:endParaRPr lang="zh-CN" altLang="en-US" dirty="0">
-              <a:ln w="3175">
-                <a:solidFill>
-                  <a:schemeClr val="tx1"/>
-                </a:solidFill>
-              </a:ln>
-              <a:solidFill>
-                <a:schemeClr val="tx1"/>
-              </a:solidFill>
-              <a:latin typeface="宋体" panose="02010600030101010101" pitchFamily="2" charset="-122"/>
-              <a:ea typeface="宋体" panose="02010600030101010101" pitchFamily="2" charset="-122"/>
-            </a:endParaRPr>
-          </a:p>
-        </p:txBody>
-      </p:sp>
-      <p:sp>
-        <p:nvSpPr>
-          <p:cNvPr id="8" name="菱形 7">
-            <a:extLst>
-              <a:ext uri="{FF2B5EF4-FFF2-40B4-BE49-F238E27FC236}">
-                <a16:creationId xmlns:a16="http://schemas.microsoft.com/office/drawing/2014/main" id="{5C9EF8D0-2995-4916-879C-B65649A08F0D}"/>
-              </a:ext>
-            </a:extLst>
-          </p:cNvPr>
-          <p:cNvSpPr/>
-          <p:nvPr/>
-        </p:nvSpPr>
-        <p:spPr>
-          <a:xfrm>
-            <a:off x="7202075" y="3044852"/>
-            <a:ext cx="2648932" cy="1159497"/>
-          </a:xfrm>
-          <a:prstGeom prst="diamond">
-            <a:avLst/>
-          </a:prstGeom>
-          <a:noFill/>
-          <a:ln w="28575">
-            <a:solidFill>
-              <a:schemeClr val="tx1"/>
-            </a:solidFill>
-          </a:ln>
-        </p:spPr>
-        <p:style>
-          <a:lnRef idx="2">
-            <a:schemeClr val="accent1">
-              <a:shade val="50000"/>
-            </a:schemeClr>
-          </a:lnRef>
-          <a:fillRef idx="1">
-            <a:schemeClr val="accent1"/>
-          </a:fillRef>
-          <a:effectRef idx="0">
-            <a:schemeClr val="accent1"/>
-          </a:effectRef>
-          <a:fontRef idx="minor">
-            <a:schemeClr val="lt1"/>
-          </a:fontRef>
-        </p:style>
-        <p:txBody>
-          <a:bodyPr rtlCol="0" anchor="ctr"/>
-          <a:lstStyle/>
-          <a:p>
-            <a:pPr algn="ctr"/>
-            <a:r>
-              <a:rPr lang="zh-CN" altLang="en-US" dirty="0">
-                <a:ln w="3175">
-                  <a:solidFill>
-                    <a:schemeClr val="tx1"/>
-                  </a:solidFill>
-                </a:ln>
-                <a:solidFill>
-                  <a:schemeClr val="tx1"/>
-                </a:solidFill>
-              </a:rPr>
-              <a:t>两张图片是否大小一致？</a:t>
-            </a:r>
-          </a:p>
-        </p:txBody>
-      </p:sp>
-      <p:sp>
-        <p:nvSpPr>
-          <p:cNvPr id="9" name="矩形 8">
-            <a:extLst>
-              <a:ext uri="{FF2B5EF4-FFF2-40B4-BE49-F238E27FC236}">
-                <a16:creationId xmlns:a16="http://schemas.microsoft.com/office/drawing/2014/main" id="{0D419256-1988-47B2-A097-7D988A36A647}"/>
-              </a:ext>
-            </a:extLst>
-          </p:cNvPr>
-          <p:cNvSpPr/>
-          <p:nvPr/>
-        </p:nvSpPr>
-        <p:spPr>
-          <a:xfrm>
-            <a:off x="7522587" y="4491868"/>
-            <a:ext cx="2004769" cy="735291"/>
-          </a:xfrm>
-          <a:prstGeom prst="rect">
-            <a:avLst/>
-          </a:prstGeom>
-          <a:noFill/>
-          <a:ln w="28575">
-            <a:solidFill>
-              <a:schemeClr val="tx1"/>
-            </a:solidFill>
-          </a:ln>
-        </p:spPr>
-        <p:style>
-          <a:lnRef idx="2">
-            <a:schemeClr val="accent1">
-              <a:shade val="50000"/>
-            </a:schemeClr>
-          </a:lnRef>
-          <a:fillRef idx="1">
-            <a:schemeClr val="accent1"/>
-          </a:fillRef>
-          <a:effectRef idx="0">
-            <a:schemeClr val="accent1"/>
-          </a:effectRef>
-          <a:fontRef idx="minor">
-            <a:schemeClr val="lt1"/>
-          </a:fontRef>
-        </p:style>
-        <p:txBody>
-          <a:bodyPr rtlCol="0" anchor="ctr"/>
-          <a:lstStyle/>
-          <a:p>
-            <a:pPr algn="ctr"/>
-            <a:r>
-              <a:rPr lang="zh-CN" altLang="en-US" dirty="0">
-                <a:ln w="3175">
-                  <a:solidFill>
-                    <a:schemeClr val="tx1"/>
-                  </a:solidFill>
-                </a:ln>
-                <a:solidFill>
-                  <a:schemeClr val="tx1"/>
-                </a:solidFill>
-                <a:latin typeface="宋体" panose="02010600030101010101" pitchFamily="2" charset="-122"/>
-                <a:ea typeface="宋体" panose="02010600030101010101" pitchFamily="2" charset="-122"/>
-              </a:rPr>
-              <a:t>原图对读入图片，逐像素相减</a:t>
-            </a:r>
-          </a:p>
-        </p:txBody>
-      </p:sp>
-      <p:cxnSp>
-        <p:nvCxnSpPr>
-          <p:cNvPr id="13" name="直接箭头连接符 12">
-            <a:extLst>
-              <a:ext uri="{FF2B5EF4-FFF2-40B4-BE49-F238E27FC236}">
-                <a16:creationId xmlns:a16="http://schemas.microsoft.com/office/drawing/2014/main" id="{6394CEC7-EE1E-4C37-9F2A-9565B8E45CA8}"/>
-              </a:ext>
-            </a:extLst>
-          </p:cNvPr>
-          <p:cNvCxnSpPr>
-            <a:cxnSpLocks/>
-            <a:endCxn id="7" idx="0"/>
-          </p:cNvCxnSpPr>
-          <p:nvPr/>
-        </p:nvCxnSpPr>
-        <p:spPr>
-          <a:xfrm>
-            <a:off x="7833676" y="1091154"/>
-            <a:ext cx="4713" cy="287518"/>
-          </a:xfrm>
-          <a:prstGeom prst="straightConnector1">
-            <a:avLst/>
-          </a:prstGeom>
-          <a:ln w="19050">
-            <a:tailEnd type="triangle"/>
-          </a:ln>
-        </p:spPr>
-        <p:style>
-          <a:lnRef idx="1">
-            <a:schemeClr val="dk1"/>
-          </a:lnRef>
-          <a:fillRef idx="0">
-            <a:schemeClr val="dk1"/>
-          </a:fillRef>
-          <a:effectRef idx="0">
-            <a:schemeClr val="dk1"/>
-          </a:effectRef>
-          <a:fontRef idx="minor">
-            <a:schemeClr val="tx1"/>
-          </a:fontRef>
-        </p:style>
-      </p:cxnSp>
-      <p:cxnSp>
-        <p:nvCxnSpPr>
-          <p:cNvPr id="14" name="直接箭头连接符 13">
-            <a:extLst>
-              <a:ext uri="{FF2B5EF4-FFF2-40B4-BE49-F238E27FC236}">
-                <a16:creationId xmlns:a16="http://schemas.microsoft.com/office/drawing/2014/main" id="{1216B951-70B8-4DFA-8A61-D60A2D1FB00E}"/>
-              </a:ext>
-            </a:extLst>
-          </p:cNvPr>
-          <p:cNvCxnSpPr>
-            <a:cxnSpLocks/>
-            <a:endCxn id="8" idx="0"/>
-          </p:cNvCxnSpPr>
-          <p:nvPr/>
-        </p:nvCxnSpPr>
-        <p:spPr>
-          <a:xfrm flipH="1">
-            <a:off x="8526541" y="2113963"/>
-            <a:ext cx="881410" cy="930889"/>
-          </a:xfrm>
-          <a:prstGeom prst="straightConnector1">
-            <a:avLst/>
-          </a:prstGeom>
-          <a:ln w="19050">
-            <a:tailEnd type="triangle"/>
-          </a:ln>
-        </p:spPr>
-        <p:style>
-          <a:lnRef idx="1">
-            <a:schemeClr val="dk1"/>
-          </a:lnRef>
-          <a:fillRef idx="0">
-            <a:schemeClr val="dk1"/>
-          </a:fillRef>
-          <a:effectRef idx="0">
-            <a:schemeClr val="dk1"/>
-          </a:effectRef>
-          <a:fontRef idx="minor">
-            <a:schemeClr val="tx1"/>
-          </a:fontRef>
-        </p:style>
-      </p:cxnSp>
-      <p:cxnSp>
-        <p:nvCxnSpPr>
-          <p:cNvPr id="15" name="直接箭头连接符 14">
-            <a:extLst>
-              <a:ext uri="{FF2B5EF4-FFF2-40B4-BE49-F238E27FC236}">
-                <a16:creationId xmlns:a16="http://schemas.microsoft.com/office/drawing/2014/main" id="{799B13BD-253E-4EA4-B5C5-67D05A1E4738}"/>
-              </a:ext>
-            </a:extLst>
-          </p:cNvPr>
-          <p:cNvCxnSpPr>
-            <a:stCxn id="8" idx="2"/>
-            <a:endCxn id="9" idx="0"/>
-          </p:cNvCxnSpPr>
-          <p:nvPr/>
-        </p:nvCxnSpPr>
-        <p:spPr>
-          <a:xfrm flipH="1">
-            <a:off x="8524972" y="4204349"/>
-            <a:ext cx="1569" cy="287519"/>
-          </a:xfrm>
-          <a:prstGeom prst="straightConnector1">
-            <a:avLst/>
-          </a:prstGeom>
-          <a:ln w="19050">
-            <a:tailEnd type="triangle"/>
-          </a:ln>
-        </p:spPr>
-        <p:style>
-          <a:lnRef idx="1">
-            <a:schemeClr val="dk1"/>
-          </a:lnRef>
-          <a:fillRef idx="0">
-            <a:schemeClr val="dk1"/>
-          </a:fillRef>
-          <a:effectRef idx="0">
-            <a:schemeClr val="dk1"/>
-          </a:effectRef>
-          <a:fontRef idx="minor">
-            <a:schemeClr val="tx1"/>
-          </a:fontRef>
-        </p:style>
-      </p:cxnSp>
-      <p:cxnSp>
-        <p:nvCxnSpPr>
-          <p:cNvPr id="16" name="直接箭头连接符 15">
-            <a:extLst>
-              <a:ext uri="{FF2B5EF4-FFF2-40B4-BE49-F238E27FC236}">
-                <a16:creationId xmlns:a16="http://schemas.microsoft.com/office/drawing/2014/main" id="{6838A5EC-8E3E-4B40-A488-2508DA1F90B3}"/>
-              </a:ext>
-            </a:extLst>
-          </p:cNvPr>
-          <p:cNvCxnSpPr>
-            <a:cxnSpLocks/>
-            <a:stCxn id="9" idx="2"/>
-          </p:cNvCxnSpPr>
-          <p:nvPr/>
-        </p:nvCxnSpPr>
-        <p:spPr>
-          <a:xfrm flipH="1">
-            <a:off x="7248002" y="5227159"/>
-            <a:ext cx="1276970" cy="252169"/>
-          </a:xfrm>
-          <a:prstGeom prst="straightConnector1">
-            <a:avLst/>
-          </a:prstGeom>
-          <a:ln w="19050">
-            <a:tailEnd type="triangle"/>
-          </a:ln>
-        </p:spPr>
-        <p:style>
-          <a:lnRef idx="1">
-            <a:schemeClr val="dk1"/>
-          </a:lnRef>
-          <a:fillRef idx="0">
-            <a:schemeClr val="dk1"/>
-          </a:fillRef>
-          <a:effectRef idx="0">
-            <a:schemeClr val="dk1"/>
-          </a:effectRef>
-          <a:fontRef idx="minor">
-            <a:schemeClr val="tx1"/>
-          </a:fontRef>
-        </p:style>
-      </p:cxnSp>
-      <p:cxnSp>
-        <p:nvCxnSpPr>
-          <p:cNvPr id="18" name="连接符: 肘形 17">
-            <a:extLst>
-              <a:ext uri="{FF2B5EF4-FFF2-40B4-BE49-F238E27FC236}">
-                <a16:creationId xmlns:a16="http://schemas.microsoft.com/office/drawing/2014/main" id="{EEED6D0F-87A0-4081-A8AF-F9E77B6B2B86}"/>
-              </a:ext>
-            </a:extLst>
-          </p:cNvPr>
-          <p:cNvCxnSpPr>
-            <a:cxnSpLocks/>
-            <a:stCxn id="8" idx="3"/>
-          </p:cNvCxnSpPr>
-          <p:nvPr/>
-        </p:nvCxnSpPr>
-        <p:spPr>
-          <a:xfrm>
-            <a:off x="9851007" y="3624601"/>
-            <a:ext cx="1668548" cy="2304863"/>
-          </a:xfrm>
-          <a:prstGeom prst="bentConnector2">
-            <a:avLst/>
-          </a:prstGeom>
-          <a:ln w="19050">
-            <a:tailEnd type="triangle"/>
-          </a:ln>
-        </p:spPr>
-        <p:style>
-          <a:lnRef idx="1">
-            <a:schemeClr val="dk1"/>
-          </a:lnRef>
-          <a:fillRef idx="0">
-            <a:schemeClr val="dk1"/>
-          </a:fillRef>
-          <a:effectRef idx="0">
-            <a:schemeClr val="dk1"/>
-          </a:effectRef>
-          <a:fontRef idx="minor">
-            <a:schemeClr val="tx1"/>
-          </a:fontRef>
-        </p:style>
-      </p:cxnSp>
-      <p:sp>
-        <p:nvSpPr>
-          <p:cNvPr id="19" name="文本框 18">
-            <a:extLst>
-              <a:ext uri="{FF2B5EF4-FFF2-40B4-BE49-F238E27FC236}">
-                <a16:creationId xmlns:a16="http://schemas.microsoft.com/office/drawing/2014/main" id="{A0FD7EF1-FF9B-4327-8E2C-5EA51DA83366}"/>
-              </a:ext>
-            </a:extLst>
-          </p:cNvPr>
-          <p:cNvSpPr txBox="1"/>
-          <p:nvPr/>
-        </p:nvSpPr>
-        <p:spPr>
-          <a:xfrm>
-            <a:off x="8719070" y="4101325"/>
-            <a:ext cx="415498" cy="369332"/>
-          </a:xfrm>
-          <a:prstGeom prst="rect">
-            <a:avLst/>
-          </a:prstGeom>
-          <a:noFill/>
-        </p:spPr>
-        <p:txBody>
-          <a:bodyPr wrap="none" rtlCol="0">
-            <a:spAutoFit/>
-          </a:bodyPr>
-          <a:lstStyle/>
-          <a:p>
-            <a:pPr algn="ctr"/>
-            <a:r>
-              <a:rPr lang="zh-CN" altLang="en-US" dirty="0">
-                <a:ln w="3175">
-                  <a:solidFill>
-                    <a:schemeClr val="tx1"/>
-                  </a:solidFill>
-                </a:ln>
-                <a:latin typeface="宋体" panose="02010600030101010101" pitchFamily="2" charset="-122"/>
-                <a:ea typeface="宋体" panose="02010600030101010101" pitchFamily="2" charset="-122"/>
-              </a:rPr>
-              <a:t>是</a:t>
-            </a:r>
-          </a:p>
-        </p:txBody>
-      </p:sp>
-      <p:sp>
-        <p:nvSpPr>
-          <p:cNvPr id="20" name="文本框 19">
-            <a:extLst>
-              <a:ext uri="{FF2B5EF4-FFF2-40B4-BE49-F238E27FC236}">
-                <a16:creationId xmlns:a16="http://schemas.microsoft.com/office/drawing/2014/main" id="{3FCF9C9D-1649-46B9-AA4A-2470A4276C1D}"/>
-              </a:ext>
-            </a:extLst>
-          </p:cNvPr>
-          <p:cNvSpPr txBox="1"/>
-          <p:nvPr/>
-        </p:nvSpPr>
-        <p:spPr>
-          <a:xfrm>
-            <a:off x="10190014" y="4101325"/>
-            <a:ext cx="415498" cy="369332"/>
-          </a:xfrm>
-          <a:prstGeom prst="rect">
-            <a:avLst/>
-          </a:prstGeom>
-          <a:noFill/>
-        </p:spPr>
-        <p:txBody>
-          <a:bodyPr wrap="none" rtlCol="0">
-            <a:spAutoFit/>
-          </a:bodyPr>
-          <a:lstStyle/>
-          <a:p>
-            <a:pPr algn="ctr"/>
-            <a:r>
-              <a:rPr lang="zh-CN" altLang="en-US" dirty="0">
-                <a:ln w="3175">
-                  <a:solidFill>
-                    <a:schemeClr val="tx1"/>
-                  </a:solidFill>
-                </a:ln>
-                <a:latin typeface="宋体" panose="02010600030101010101" pitchFamily="2" charset="-122"/>
-                <a:ea typeface="宋体" panose="02010600030101010101" pitchFamily="2" charset="-122"/>
-              </a:rPr>
-              <a:t>否</a:t>
-            </a:r>
-          </a:p>
-        </p:txBody>
-      </p:sp>
       <p:grpSp>
         <p:nvGrpSpPr>
           <p:cNvPr id="63" name="组合 62">
@@ -6668,6 +6177,1232 @@
           </p:style>
         </p:cxnSp>
       </p:grpSp>
+      <p:grpSp>
+        <p:nvGrpSpPr>
+          <p:cNvPr id="77" name="组合 76">
+            <a:extLst>
+              <a:ext uri="{FF2B5EF4-FFF2-40B4-BE49-F238E27FC236}">
+                <a16:creationId xmlns:a16="http://schemas.microsoft.com/office/drawing/2014/main" id="{EBB923FD-DC17-402B-B7C4-3093D210A9FE}"/>
+              </a:ext>
+            </a:extLst>
+          </p:cNvPr>
+          <p:cNvGrpSpPr/>
+          <p:nvPr/>
+        </p:nvGrpSpPr>
+        <p:grpSpPr>
+          <a:xfrm>
+            <a:off x="6731401" y="0"/>
+            <a:ext cx="4980135" cy="8665616"/>
+            <a:chOff x="6731401" y="0"/>
+            <a:chExt cx="4980135" cy="8665616"/>
+          </a:xfrm>
+        </p:grpSpPr>
+        <p:sp>
+          <p:nvSpPr>
+            <p:cNvPr id="34" name="矩形: 圆角 33">
+              <a:extLst>
+                <a:ext uri="{FF2B5EF4-FFF2-40B4-BE49-F238E27FC236}">
+                  <a16:creationId xmlns:a16="http://schemas.microsoft.com/office/drawing/2014/main" id="{76E3C628-8EA4-44AC-BDB8-A18DAB4CD654}"/>
+                </a:ext>
+              </a:extLst>
+            </p:cNvPr>
+            <p:cNvSpPr/>
+            <p:nvPr/>
+          </p:nvSpPr>
+          <p:spPr>
+            <a:xfrm>
+              <a:off x="7476217" y="0"/>
+              <a:ext cx="1159497" cy="527901"/>
+            </a:xfrm>
+            <a:prstGeom prst="roundRect">
+              <a:avLst/>
+            </a:prstGeom>
+            <a:noFill/>
+            <a:ln w="28575">
+              <a:solidFill>
+                <a:schemeClr val="tx1"/>
+              </a:solidFill>
+            </a:ln>
+          </p:spPr>
+          <p:style>
+            <a:lnRef idx="2">
+              <a:schemeClr val="accent1">
+                <a:shade val="50000"/>
+              </a:schemeClr>
+            </a:lnRef>
+            <a:fillRef idx="1">
+              <a:schemeClr val="accent1"/>
+            </a:fillRef>
+            <a:effectRef idx="0">
+              <a:schemeClr val="accent1"/>
+            </a:effectRef>
+            <a:fontRef idx="minor">
+              <a:schemeClr val="lt1"/>
+            </a:fontRef>
+          </p:style>
+          <p:txBody>
+            <a:bodyPr rtlCol="0" anchor="ctr"/>
+            <a:lstStyle/>
+            <a:p>
+              <a:pPr algn="ctr"/>
+              <a:r>
+                <a:rPr lang="zh-CN" altLang="en-US" dirty="0">
+                  <a:ln w="3175">
+                    <a:solidFill>
+                      <a:schemeClr val="tx1"/>
+                    </a:solidFill>
+                  </a:ln>
+                  <a:solidFill>
+                    <a:schemeClr val="tx1"/>
+                  </a:solidFill>
+                  <a:latin typeface="宋体" panose="02010600030101010101" pitchFamily="2" charset="-122"/>
+                  <a:ea typeface="宋体" panose="02010600030101010101" pitchFamily="2" charset="-122"/>
+                </a:rPr>
+                <a:t>开始</a:t>
+              </a:r>
+            </a:p>
+          </p:txBody>
+        </p:sp>
+        <p:sp>
+          <p:nvSpPr>
+            <p:cNvPr id="35" name="矩形 34">
+              <a:extLst>
+                <a:ext uri="{FF2B5EF4-FFF2-40B4-BE49-F238E27FC236}">
+                  <a16:creationId xmlns:a16="http://schemas.microsoft.com/office/drawing/2014/main" id="{F8E41AEA-7CCB-49E7-BD71-EB2187D1B9B4}"/>
+                </a:ext>
+              </a:extLst>
+            </p:cNvPr>
+            <p:cNvSpPr/>
+            <p:nvPr/>
+          </p:nvSpPr>
+          <p:spPr>
+            <a:xfrm>
+              <a:off x="7191282" y="820132"/>
+              <a:ext cx="1729692" cy="527901"/>
+            </a:xfrm>
+            <a:prstGeom prst="rect">
+              <a:avLst/>
+            </a:prstGeom>
+            <a:noFill/>
+            <a:ln w="28575">
+              <a:solidFill>
+                <a:schemeClr val="tx1"/>
+              </a:solidFill>
+            </a:ln>
+          </p:spPr>
+          <p:style>
+            <a:lnRef idx="2">
+              <a:schemeClr val="accent1">
+                <a:shade val="50000"/>
+              </a:schemeClr>
+            </a:lnRef>
+            <a:fillRef idx="1">
+              <a:schemeClr val="accent1"/>
+            </a:fillRef>
+            <a:effectRef idx="0">
+              <a:schemeClr val="accent1"/>
+            </a:effectRef>
+            <a:fontRef idx="minor">
+              <a:schemeClr val="lt1"/>
+            </a:fontRef>
+          </p:style>
+          <p:txBody>
+            <a:bodyPr rtlCol="0" anchor="ctr"/>
+            <a:lstStyle/>
+            <a:p>
+              <a:pPr algn="ctr"/>
+              <a:r>
+                <a:rPr lang="zh-CN" altLang="en-US" dirty="0">
+                  <a:ln w="3175">
+                    <a:solidFill>
+                      <a:schemeClr val="tx1"/>
+                    </a:solidFill>
+                  </a:ln>
+                  <a:solidFill>
+                    <a:schemeClr val="tx1"/>
+                  </a:solidFill>
+                  <a:latin typeface="宋体" panose="02010600030101010101" pitchFamily="2" charset="-122"/>
+                  <a:ea typeface="宋体" panose="02010600030101010101" pitchFamily="2" charset="-122"/>
+                </a:rPr>
+                <a:t>读入图片和</a:t>
+              </a:r>
+              <a:endParaRPr lang="en-US" altLang="zh-CN" dirty="0">
+                <a:ln w="3175">
+                  <a:solidFill>
+                    <a:schemeClr val="tx1"/>
+                  </a:solidFill>
+                </a:ln>
+                <a:solidFill>
+                  <a:schemeClr val="tx1"/>
+                </a:solidFill>
+                <a:latin typeface="宋体" panose="02010600030101010101" pitchFamily="2" charset="-122"/>
+                <a:ea typeface="宋体" panose="02010600030101010101" pitchFamily="2" charset="-122"/>
+              </a:endParaRPr>
+            </a:p>
+            <a:p>
+              <a:pPr algn="ctr"/>
+              <a:r>
+                <a:rPr lang="zh-CN" altLang="en-US" dirty="0">
+                  <a:ln w="3175">
+                    <a:solidFill>
+                      <a:schemeClr val="tx1"/>
+                    </a:solidFill>
+                  </a:ln>
+                  <a:solidFill>
+                    <a:schemeClr val="tx1"/>
+                  </a:solidFill>
+                  <a:latin typeface="宋体" panose="02010600030101010101" pitchFamily="2" charset="-122"/>
+                  <a:ea typeface="宋体" panose="02010600030101010101" pitchFamily="2" charset="-122"/>
+                </a:rPr>
+                <a:t>待匹配图片</a:t>
+              </a:r>
+            </a:p>
+          </p:txBody>
+        </p:sp>
+        <p:sp>
+          <p:nvSpPr>
+            <p:cNvPr id="36" name="矩形 35">
+              <a:extLst>
+                <a:ext uri="{FF2B5EF4-FFF2-40B4-BE49-F238E27FC236}">
+                  <a16:creationId xmlns:a16="http://schemas.microsoft.com/office/drawing/2014/main" id="{090A7862-B921-4617-B8D1-E3CEEAB083E7}"/>
+                </a:ext>
+              </a:extLst>
+            </p:cNvPr>
+            <p:cNvSpPr/>
+            <p:nvPr/>
+          </p:nvSpPr>
+          <p:spPr>
+            <a:xfrm>
+              <a:off x="7038974" y="6378584"/>
+              <a:ext cx="2045713" cy="622166"/>
+            </a:xfrm>
+            <a:prstGeom prst="rect">
+              <a:avLst/>
+            </a:prstGeom>
+            <a:noFill/>
+            <a:ln w="28575">
+              <a:solidFill>
+                <a:schemeClr val="tx1"/>
+              </a:solidFill>
+            </a:ln>
+          </p:spPr>
+          <p:style>
+            <a:lnRef idx="2">
+              <a:schemeClr val="accent1">
+                <a:shade val="50000"/>
+              </a:schemeClr>
+            </a:lnRef>
+            <a:fillRef idx="1">
+              <a:schemeClr val="accent1"/>
+            </a:fillRef>
+            <a:effectRef idx="0">
+              <a:schemeClr val="accent1"/>
+            </a:effectRef>
+            <a:fontRef idx="minor">
+              <a:schemeClr val="lt1"/>
+            </a:fontRef>
+          </p:style>
+          <p:txBody>
+            <a:bodyPr rtlCol="0" anchor="ctr"/>
+            <a:lstStyle/>
+            <a:p>
+              <a:pPr algn="ctr"/>
+              <a:r>
+                <a:rPr lang="zh-CN" altLang="en-US" dirty="0">
+                  <a:ln w="3175">
+                    <a:solidFill>
+                      <a:schemeClr val="tx1"/>
+                    </a:solidFill>
+                  </a:ln>
+                  <a:solidFill>
+                    <a:schemeClr val="tx1"/>
+                  </a:solidFill>
+                  <a:latin typeface="宋体" panose="02010600030101010101" pitchFamily="2" charset="-122"/>
+                  <a:ea typeface="宋体" panose="02010600030101010101" pitchFamily="2" charset="-122"/>
+                </a:rPr>
+                <a:t>根据映射关系得到匹配后的图片</a:t>
+              </a:r>
+            </a:p>
+          </p:txBody>
+        </p:sp>
+        <p:sp>
+          <p:nvSpPr>
+            <p:cNvPr id="39" name="矩形: 圆角 38">
+              <a:extLst>
+                <a:ext uri="{FF2B5EF4-FFF2-40B4-BE49-F238E27FC236}">
+                  <a16:creationId xmlns:a16="http://schemas.microsoft.com/office/drawing/2014/main" id="{DED3CE19-4871-4443-8472-C9EA5344B6E4}"/>
+                </a:ext>
+              </a:extLst>
+            </p:cNvPr>
+            <p:cNvSpPr/>
+            <p:nvPr/>
+          </p:nvSpPr>
+          <p:spPr>
+            <a:xfrm>
+              <a:off x="7476217" y="8175422"/>
+              <a:ext cx="1159497" cy="490194"/>
+            </a:xfrm>
+            <a:prstGeom prst="roundRect">
+              <a:avLst/>
+            </a:prstGeom>
+            <a:noFill/>
+            <a:ln w="28575">
+              <a:solidFill>
+                <a:schemeClr val="tx1"/>
+              </a:solidFill>
+            </a:ln>
+          </p:spPr>
+          <p:style>
+            <a:lnRef idx="2">
+              <a:schemeClr val="accent1">
+                <a:shade val="50000"/>
+              </a:schemeClr>
+            </a:lnRef>
+            <a:fillRef idx="1">
+              <a:schemeClr val="accent1"/>
+            </a:fillRef>
+            <a:effectRef idx="0">
+              <a:schemeClr val="accent1"/>
+            </a:effectRef>
+            <a:fontRef idx="minor">
+              <a:schemeClr val="lt1"/>
+            </a:fontRef>
+          </p:style>
+          <p:txBody>
+            <a:bodyPr rtlCol="0" anchor="ctr"/>
+            <a:lstStyle/>
+            <a:p>
+              <a:pPr algn="ctr"/>
+              <a:r>
+                <a:rPr lang="zh-CN" altLang="en-US" dirty="0">
+                  <a:ln w="3175">
+                    <a:solidFill>
+                      <a:schemeClr val="tx1"/>
+                    </a:solidFill>
+                  </a:ln>
+                  <a:solidFill>
+                    <a:schemeClr val="tx1"/>
+                  </a:solidFill>
+                  <a:latin typeface="宋体" panose="02010600030101010101" pitchFamily="2" charset="-122"/>
+                  <a:ea typeface="宋体" panose="02010600030101010101" pitchFamily="2" charset="-122"/>
+                </a:rPr>
+                <a:t>结束</a:t>
+              </a:r>
+            </a:p>
+          </p:txBody>
+        </p:sp>
+        <p:cxnSp>
+          <p:nvCxnSpPr>
+            <p:cNvPr id="40" name="直接箭头连接符 39">
+              <a:extLst>
+                <a:ext uri="{FF2B5EF4-FFF2-40B4-BE49-F238E27FC236}">
+                  <a16:creationId xmlns:a16="http://schemas.microsoft.com/office/drawing/2014/main" id="{1AF9A1E7-DA00-48F3-858A-FC9E23ACD19F}"/>
+                </a:ext>
+              </a:extLst>
+            </p:cNvPr>
+            <p:cNvCxnSpPr>
+              <a:cxnSpLocks/>
+              <a:stCxn id="34" idx="2"/>
+              <a:endCxn id="35" idx="0"/>
+            </p:cNvCxnSpPr>
+            <p:nvPr/>
+          </p:nvCxnSpPr>
+          <p:spPr>
+            <a:xfrm>
+              <a:off x="8055966" y="527901"/>
+              <a:ext cx="162" cy="292231"/>
+            </a:xfrm>
+            <a:prstGeom prst="straightConnector1">
+              <a:avLst/>
+            </a:prstGeom>
+            <a:ln w="19050">
+              <a:tailEnd type="triangle"/>
+            </a:ln>
+          </p:spPr>
+          <p:style>
+            <a:lnRef idx="1">
+              <a:schemeClr val="dk1"/>
+            </a:lnRef>
+            <a:fillRef idx="0">
+              <a:schemeClr val="dk1"/>
+            </a:fillRef>
+            <a:effectRef idx="0">
+              <a:schemeClr val="dk1"/>
+            </a:effectRef>
+            <a:fontRef idx="minor">
+              <a:schemeClr val="tx1"/>
+            </a:fontRef>
+          </p:style>
+        </p:cxnSp>
+        <p:cxnSp>
+          <p:nvCxnSpPr>
+            <p:cNvPr id="42" name="直接箭头连接符 41">
+              <a:extLst>
+                <a:ext uri="{FF2B5EF4-FFF2-40B4-BE49-F238E27FC236}">
+                  <a16:creationId xmlns:a16="http://schemas.microsoft.com/office/drawing/2014/main" id="{274456E4-5D48-44A0-BE98-4DD942A306DD}"/>
+                </a:ext>
+              </a:extLst>
+            </p:cNvPr>
+            <p:cNvCxnSpPr>
+              <a:cxnSpLocks/>
+              <a:stCxn id="36" idx="2"/>
+              <a:endCxn id="70" idx="0"/>
+            </p:cNvCxnSpPr>
+            <p:nvPr/>
+          </p:nvCxnSpPr>
+          <p:spPr>
+            <a:xfrm>
+              <a:off x="8061831" y="7000750"/>
+              <a:ext cx="1651" cy="311083"/>
+            </a:xfrm>
+            <a:prstGeom prst="straightConnector1">
+              <a:avLst/>
+            </a:prstGeom>
+            <a:ln w="19050">
+              <a:tailEnd type="triangle"/>
+            </a:ln>
+          </p:spPr>
+          <p:style>
+            <a:lnRef idx="1">
+              <a:schemeClr val="dk1"/>
+            </a:lnRef>
+            <a:fillRef idx="0">
+              <a:schemeClr val="dk1"/>
+            </a:fillRef>
+            <a:effectRef idx="0">
+              <a:schemeClr val="dk1"/>
+            </a:effectRef>
+            <a:fontRef idx="minor">
+              <a:schemeClr val="tx1"/>
+            </a:fontRef>
+          </p:style>
+        </p:cxnSp>
+        <p:sp>
+          <p:nvSpPr>
+            <p:cNvPr id="43" name="菱形 42">
+              <a:extLst>
+                <a:ext uri="{FF2B5EF4-FFF2-40B4-BE49-F238E27FC236}">
+                  <a16:creationId xmlns:a16="http://schemas.microsoft.com/office/drawing/2014/main" id="{3CB809C5-BBA8-42B7-8F3B-FB082886DC11}"/>
+                </a:ext>
+              </a:extLst>
+            </p:cNvPr>
+            <p:cNvSpPr/>
+            <p:nvPr/>
+          </p:nvSpPr>
+          <p:spPr>
+            <a:xfrm>
+              <a:off x="6731401" y="1633191"/>
+              <a:ext cx="2648932" cy="1159497"/>
+            </a:xfrm>
+            <a:prstGeom prst="diamond">
+              <a:avLst/>
+            </a:prstGeom>
+            <a:noFill/>
+            <a:ln w="28575">
+              <a:solidFill>
+                <a:schemeClr val="tx1"/>
+              </a:solidFill>
+            </a:ln>
+          </p:spPr>
+          <p:style>
+            <a:lnRef idx="2">
+              <a:schemeClr val="accent1">
+                <a:shade val="50000"/>
+              </a:schemeClr>
+            </a:lnRef>
+            <a:fillRef idx="1">
+              <a:schemeClr val="accent1"/>
+            </a:fillRef>
+            <a:effectRef idx="0">
+              <a:schemeClr val="accent1"/>
+            </a:effectRef>
+            <a:fontRef idx="minor">
+              <a:schemeClr val="lt1"/>
+            </a:fontRef>
+          </p:style>
+          <p:txBody>
+            <a:bodyPr rtlCol="0" anchor="ctr"/>
+            <a:lstStyle/>
+            <a:p>
+              <a:pPr algn="ctr"/>
+              <a:r>
+                <a:rPr lang="zh-CN" altLang="en-US" dirty="0">
+                  <a:ln w="3175">
+                    <a:solidFill>
+                      <a:schemeClr val="tx1"/>
+                    </a:solidFill>
+                  </a:ln>
+                  <a:solidFill>
+                    <a:schemeClr val="tx1"/>
+                  </a:solidFill>
+                </a:rPr>
+                <a:t>是否为彩色图片？</a:t>
+              </a:r>
+            </a:p>
+          </p:txBody>
+        </p:sp>
+        <p:sp>
+          <p:nvSpPr>
+            <p:cNvPr id="45" name="文本框 44">
+              <a:extLst>
+                <a:ext uri="{FF2B5EF4-FFF2-40B4-BE49-F238E27FC236}">
+                  <a16:creationId xmlns:a16="http://schemas.microsoft.com/office/drawing/2014/main" id="{A47C7E9F-0E89-4AFF-B733-F8CF72632F17}"/>
+                </a:ext>
+              </a:extLst>
+            </p:cNvPr>
+            <p:cNvSpPr txBox="1"/>
+            <p:nvPr/>
+          </p:nvSpPr>
+          <p:spPr>
+            <a:xfrm>
+              <a:off x="10505757" y="2253329"/>
+              <a:ext cx="415498" cy="369332"/>
+            </a:xfrm>
+            <a:prstGeom prst="rect">
+              <a:avLst/>
+            </a:prstGeom>
+            <a:noFill/>
+          </p:spPr>
+          <p:txBody>
+            <a:bodyPr wrap="square" rtlCol="0">
+              <a:spAutoFit/>
+            </a:bodyPr>
+            <a:lstStyle/>
+            <a:p>
+              <a:pPr algn="ctr"/>
+              <a:r>
+                <a:rPr lang="zh-CN" altLang="en-US" dirty="0">
+                  <a:ln w="3175">
+                    <a:solidFill>
+                      <a:schemeClr val="tx1"/>
+                    </a:solidFill>
+                  </a:ln>
+                  <a:latin typeface="宋体" panose="02010600030101010101" pitchFamily="2" charset="-122"/>
+                  <a:ea typeface="宋体" panose="02010600030101010101" pitchFamily="2" charset="-122"/>
+                </a:rPr>
+                <a:t>是</a:t>
+              </a:r>
+            </a:p>
+          </p:txBody>
+        </p:sp>
+        <p:sp>
+          <p:nvSpPr>
+            <p:cNvPr id="46" name="文本框 45">
+              <a:extLst>
+                <a:ext uri="{FF2B5EF4-FFF2-40B4-BE49-F238E27FC236}">
+                  <a16:creationId xmlns:a16="http://schemas.microsoft.com/office/drawing/2014/main" id="{48AA0913-50FA-4122-AEB9-C8619E7E2D1A}"/>
+                </a:ext>
+              </a:extLst>
+            </p:cNvPr>
+            <p:cNvSpPr txBox="1"/>
+            <p:nvPr/>
+          </p:nvSpPr>
+          <p:spPr>
+            <a:xfrm>
+              <a:off x="8060220" y="2724163"/>
+              <a:ext cx="415498" cy="369332"/>
+            </a:xfrm>
+            <a:prstGeom prst="rect">
+              <a:avLst/>
+            </a:prstGeom>
+            <a:noFill/>
+          </p:spPr>
+          <p:txBody>
+            <a:bodyPr wrap="none" rtlCol="0">
+              <a:spAutoFit/>
+            </a:bodyPr>
+            <a:lstStyle/>
+            <a:p>
+              <a:pPr algn="ctr"/>
+              <a:r>
+                <a:rPr lang="zh-CN" altLang="en-US" dirty="0">
+                  <a:ln w="3175">
+                    <a:solidFill>
+                      <a:schemeClr val="tx1"/>
+                    </a:solidFill>
+                  </a:ln>
+                  <a:latin typeface="宋体" panose="02010600030101010101" pitchFamily="2" charset="-122"/>
+                  <a:ea typeface="宋体" panose="02010600030101010101" pitchFamily="2" charset="-122"/>
+                </a:rPr>
+                <a:t>否</a:t>
+              </a:r>
+            </a:p>
+          </p:txBody>
+        </p:sp>
+        <p:sp>
+          <p:nvSpPr>
+            <p:cNvPr id="48" name="矩形 47">
+              <a:extLst>
+                <a:ext uri="{FF2B5EF4-FFF2-40B4-BE49-F238E27FC236}">
+                  <a16:creationId xmlns:a16="http://schemas.microsoft.com/office/drawing/2014/main" id="{D891376B-BF4F-4C43-9797-187338DECB71}"/>
+                </a:ext>
+              </a:extLst>
+            </p:cNvPr>
+            <p:cNvSpPr/>
+            <p:nvPr/>
+          </p:nvSpPr>
+          <p:spPr>
+            <a:xfrm>
+              <a:off x="7057835" y="3148369"/>
+              <a:ext cx="2004769" cy="735291"/>
+            </a:xfrm>
+            <a:prstGeom prst="rect">
+              <a:avLst/>
+            </a:prstGeom>
+            <a:noFill/>
+            <a:ln w="28575">
+              <a:solidFill>
+                <a:schemeClr val="tx1"/>
+              </a:solidFill>
+            </a:ln>
+          </p:spPr>
+          <p:style>
+            <a:lnRef idx="2">
+              <a:schemeClr val="accent1">
+                <a:shade val="50000"/>
+              </a:schemeClr>
+            </a:lnRef>
+            <a:fillRef idx="1">
+              <a:schemeClr val="accent1"/>
+            </a:fillRef>
+            <a:effectRef idx="0">
+              <a:schemeClr val="accent1"/>
+            </a:effectRef>
+            <a:fontRef idx="minor">
+              <a:schemeClr val="lt1"/>
+            </a:fontRef>
+          </p:style>
+          <p:txBody>
+            <a:bodyPr rtlCol="0" anchor="ctr"/>
+            <a:lstStyle/>
+            <a:p>
+              <a:pPr algn="ctr"/>
+              <a:r>
+                <a:rPr lang="zh-CN" altLang="en-US" dirty="0">
+                  <a:ln w="3175">
+                    <a:solidFill>
+                      <a:schemeClr val="tx1"/>
+                    </a:solidFill>
+                  </a:ln>
+                  <a:solidFill>
+                    <a:schemeClr val="tx1"/>
+                  </a:solidFill>
+                  <a:latin typeface="宋体" panose="02010600030101010101" pitchFamily="2" charset="-122"/>
+                  <a:ea typeface="宋体" panose="02010600030101010101" pitchFamily="2" charset="-122"/>
+                </a:rPr>
+                <a:t>对原图片计算统计直方图</a:t>
+              </a:r>
+            </a:p>
+          </p:txBody>
+        </p:sp>
+        <p:sp>
+          <p:nvSpPr>
+            <p:cNvPr id="49" name="矩形 48">
+              <a:extLst>
+                <a:ext uri="{FF2B5EF4-FFF2-40B4-BE49-F238E27FC236}">
+                  <a16:creationId xmlns:a16="http://schemas.microsoft.com/office/drawing/2014/main" id="{8C939503-74C4-4CB7-A299-DBEB241DFDC9}"/>
+                </a:ext>
+              </a:extLst>
+            </p:cNvPr>
+            <p:cNvSpPr/>
+            <p:nvPr/>
+          </p:nvSpPr>
+          <p:spPr>
+            <a:xfrm>
+              <a:off x="7057835" y="4237350"/>
+              <a:ext cx="2004769" cy="735291"/>
+            </a:xfrm>
+            <a:prstGeom prst="rect">
+              <a:avLst/>
+            </a:prstGeom>
+            <a:noFill/>
+            <a:ln w="28575">
+              <a:solidFill>
+                <a:schemeClr val="tx1"/>
+              </a:solidFill>
+            </a:ln>
+          </p:spPr>
+          <p:style>
+            <a:lnRef idx="2">
+              <a:schemeClr val="accent1">
+                <a:shade val="50000"/>
+              </a:schemeClr>
+            </a:lnRef>
+            <a:fillRef idx="1">
+              <a:schemeClr val="accent1"/>
+            </a:fillRef>
+            <a:effectRef idx="0">
+              <a:schemeClr val="accent1"/>
+            </a:effectRef>
+            <a:fontRef idx="minor">
+              <a:schemeClr val="lt1"/>
+            </a:fontRef>
+          </p:style>
+          <p:txBody>
+            <a:bodyPr rtlCol="0" anchor="ctr"/>
+            <a:lstStyle/>
+            <a:p>
+              <a:pPr algn="ctr"/>
+              <a:r>
+                <a:rPr lang="zh-CN" altLang="en-US" dirty="0">
+                  <a:ln w="3175">
+                    <a:solidFill>
+                      <a:schemeClr val="tx1"/>
+                    </a:solidFill>
+                  </a:ln>
+                  <a:solidFill>
+                    <a:schemeClr val="tx1"/>
+                  </a:solidFill>
+                  <a:latin typeface="宋体" panose="02010600030101010101" pitchFamily="2" charset="-122"/>
+                  <a:ea typeface="宋体" panose="02010600030101010101" pitchFamily="2" charset="-122"/>
+                </a:rPr>
+                <a:t>计算待匹配图片各像素值统计量</a:t>
+              </a:r>
+            </a:p>
+          </p:txBody>
+        </p:sp>
+        <p:sp>
+          <p:nvSpPr>
+            <p:cNvPr id="51" name="矩形 50">
+              <a:extLst>
+                <a:ext uri="{FF2B5EF4-FFF2-40B4-BE49-F238E27FC236}">
+                  <a16:creationId xmlns:a16="http://schemas.microsoft.com/office/drawing/2014/main" id="{29097094-9EEC-4E2A-9D76-B2B5E8E16E2C}"/>
+                </a:ext>
+              </a:extLst>
+            </p:cNvPr>
+            <p:cNvSpPr/>
+            <p:nvPr/>
+          </p:nvSpPr>
+          <p:spPr>
+            <a:xfrm>
+              <a:off x="10085224" y="3195504"/>
+              <a:ext cx="1626312" cy="625383"/>
+            </a:xfrm>
+            <a:prstGeom prst="rect">
+              <a:avLst/>
+            </a:prstGeom>
+            <a:noFill/>
+            <a:ln w="28575">
+              <a:solidFill>
+                <a:schemeClr val="tx1"/>
+              </a:solidFill>
+            </a:ln>
+          </p:spPr>
+          <p:style>
+            <a:lnRef idx="2">
+              <a:schemeClr val="accent1">
+                <a:shade val="50000"/>
+              </a:schemeClr>
+            </a:lnRef>
+            <a:fillRef idx="1">
+              <a:schemeClr val="accent1"/>
+            </a:fillRef>
+            <a:effectRef idx="0">
+              <a:schemeClr val="accent1"/>
+            </a:effectRef>
+            <a:fontRef idx="minor">
+              <a:schemeClr val="lt1"/>
+            </a:fontRef>
+          </p:style>
+          <p:txBody>
+            <a:bodyPr rtlCol="0" anchor="ctr"/>
+            <a:lstStyle/>
+            <a:p>
+              <a:pPr algn="ctr"/>
+              <a:r>
+                <a:rPr lang="zh-CN" altLang="en-US" dirty="0">
+                  <a:ln w="3175">
+                    <a:solidFill>
+                      <a:schemeClr val="tx1"/>
+                    </a:solidFill>
+                  </a:ln>
+                  <a:solidFill>
+                    <a:schemeClr val="tx1"/>
+                  </a:solidFill>
+                  <a:latin typeface="宋体" panose="02010600030101010101" pitchFamily="2" charset="-122"/>
+                  <a:ea typeface="宋体" panose="02010600030101010101" pitchFamily="2" charset="-122"/>
+                </a:rPr>
+                <a:t>将彩色图片转换为灰度图</a:t>
+              </a:r>
+            </a:p>
+          </p:txBody>
+        </p:sp>
+        <p:sp>
+          <p:nvSpPr>
+            <p:cNvPr id="52" name="矩形 51">
+              <a:extLst>
+                <a:ext uri="{FF2B5EF4-FFF2-40B4-BE49-F238E27FC236}">
+                  <a16:creationId xmlns:a16="http://schemas.microsoft.com/office/drawing/2014/main" id="{73633547-1B94-43CC-BCDC-EF09D84A7E8A}"/>
+                </a:ext>
+              </a:extLst>
+            </p:cNvPr>
+            <p:cNvSpPr/>
+            <p:nvPr/>
+          </p:nvSpPr>
+          <p:spPr>
+            <a:xfrm>
+              <a:off x="6746630" y="5307967"/>
+              <a:ext cx="2633704" cy="735291"/>
+            </a:xfrm>
+            <a:prstGeom prst="rect">
+              <a:avLst/>
+            </a:prstGeom>
+            <a:noFill/>
+            <a:ln w="28575">
+              <a:solidFill>
+                <a:schemeClr val="tx1"/>
+              </a:solidFill>
+            </a:ln>
+          </p:spPr>
+          <p:style>
+            <a:lnRef idx="2">
+              <a:schemeClr val="accent1">
+                <a:shade val="50000"/>
+              </a:schemeClr>
+            </a:lnRef>
+            <a:fillRef idx="1">
+              <a:schemeClr val="accent1"/>
+            </a:fillRef>
+            <a:effectRef idx="0">
+              <a:schemeClr val="accent1"/>
+            </a:effectRef>
+            <a:fontRef idx="minor">
+              <a:schemeClr val="lt1"/>
+            </a:fontRef>
+          </p:style>
+          <p:txBody>
+            <a:bodyPr rtlCol="0" anchor="ctr"/>
+            <a:lstStyle/>
+            <a:p>
+              <a:pPr algn="ctr"/>
+              <a:r>
+                <a:rPr lang="zh-CN" altLang="en-US" dirty="0">
+                  <a:ln w="3175">
+                    <a:solidFill>
+                      <a:schemeClr val="tx1"/>
+                    </a:solidFill>
+                  </a:ln>
+                  <a:solidFill>
+                    <a:schemeClr val="tx1"/>
+                  </a:solidFill>
+                  <a:latin typeface="宋体" panose="02010600030101010101" pitchFamily="2" charset="-122"/>
+                  <a:ea typeface="宋体" panose="02010600030101010101" pitchFamily="2" charset="-122"/>
+                </a:rPr>
+                <a:t>根据统计量和源直方图建立像素点映射关系</a:t>
+              </a:r>
+            </a:p>
+          </p:txBody>
+        </p:sp>
+        <p:cxnSp>
+          <p:nvCxnSpPr>
+            <p:cNvPr id="54" name="直接箭头连接符 53">
+              <a:extLst>
+                <a:ext uri="{FF2B5EF4-FFF2-40B4-BE49-F238E27FC236}">
+                  <a16:creationId xmlns:a16="http://schemas.microsoft.com/office/drawing/2014/main" id="{02EC3C45-0A37-49E9-B9A0-31AE00E37E8D}"/>
+                </a:ext>
+              </a:extLst>
+            </p:cNvPr>
+            <p:cNvCxnSpPr>
+              <a:cxnSpLocks/>
+              <a:stCxn id="35" idx="2"/>
+              <a:endCxn id="43" idx="0"/>
+            </p:cNvCxnSpPr>
+            <p:nvPr/>
+          </p:nvCxnSpPr>
+          <p:spPr>
+            <a:xfrm flipH="1">
+              <a:off x="8055867" y="1348033"/>
+              <a:ext cx="261" cy="285158"/>
+            </a:xfrm>
+            <a:prstGeom prst="straightConnector1">
+              <a:avLst/>
+            </a:prstGeom>
+            <a:ln w="19050">
+              <a:tailEnd type="triangle"/>
+            </a:ln>
+          </p:spPr>
+          <p:style>
+            <a:lnRef idx="1">
+              <a:schemeClr val="dk1"/>
+            </a:lnRef>
+            <a:fillRef idx="0">
+              <a:schemeClr val="dk1"/>
+            </a:fillRef>
+            <a:effectRef idx="0">
+              <a:schemeClr val="dk1"/>
+            </a:effectRef>
+            <a:fontRef idx="minor">
+              <a:schemeClr val="tx1"/>
+            </a:fontRef>
+          </p:style>
+        </p:cxnSp>
+        <p:cxnSp>
+          <p:nvCxnSpPr>
+            <p:cNvPr id="55" name="连接符: 肘形 54">
+              <a:extLst>
+                <a:ext uri="{FF2B5EF4-FFF2-40B4-BE49-F238E27FC236}">
+                  <a16:creationId xmlns:a16="http://schemas.microsoft.com/office/drawing/2014/main" id="{6402BC3A-828A-4667-83B0-0A0DE3C5F492}"/>
+                </a:ext>
+              </a:extLst>
+            </p:cNvPr>
+            <p:cNvCxnSpPr>
+              <a:cxnSpLocks/>
+              <a:stCxn id="43" idx="3"/>
+              <a:endCxn id="51" idx="0"/>
+            </p:cNvCxnSpPr>
+            <p:nvPr/>
+          </p:nvCxnSpPr>
+          <p:spPr>
+            <a:xfrm>
+              <a:off x="9380333" y="2212940"/>
+              <a:ext cx="1518047" cy="982564"/>
+            </a:xfrm>
+            <a:prstGeom prst="bentConnector2">
+              <a:avLst/>
+            </a:prstGeom>
+            <a:ln w="19050">
+              <a:tailEnd type="triangle"/>
+            </a:ln>
+          </p:spPr>
+          <p:style>
+            <a:lnRef idx="1">
+              <a:schemeClr val="dk1"/>
+            </a:lnRef>
+            <a:fillRef idx="0">
+              <a:schemeClr val="dk1"/>
+            </a:fillRef>
+            <a:effectRef idx="0">
+              <a:schemeClr val="dk1"/>
+            </a:effectRef>
+            <a:fontRef idx="minor">
+              <a:schemeClr val="tx1"/>
+            </a:fontRef>
+          </p:style>
+        </p:cxnSp>
+        <p:cxnSp>
+          <p:nvCxnSpPr>
+            <p:cNvPr id="57" name="直接箭头连接符 56">
+              <a:extLst>
+                <a:ext uri="{FF2B5EF4-FFF2-40B4-BE49-F238E27FC236}">
+                  <a16:creationId xmlns:a16="http://schemas.microsoft.com/office/drawing/2014/main" id="{F614F5B8-BFDF-4B7F-AEC1-F9AC56722A91}"/>
+                </a:ext>
+              </a:extLst>
+            </p:cNvPr>
+            <p:cNvCxnSpPr>
+              <a:cxnSpLocks/>
+              <a:stCxn id="43" idx="2"/>
+              <a:endCxn id="48" idx="0"/>
+            </p:cNvCxnSpPr>
+            <p:nvPr/>
+          </p:nvCxnSpPr>
+          <p:spPr>
+            <a:xfrm>
+              <a:off x="8055867" y="2792688"/>
+              <a:ext cx="4353" cy="355681"/>
+            </a:xfrm>
+            <a:prstGeom prst="straightConnector1">
+              <a:avLst/>
+            </a:prstGeom>
+            <a:ln w="19050">
+              <a:tailEnd type="triangle"/>
+            </a:ln>
+          </p:spPr>
+          <p:style>
+            <a:lnRef idx="1">
+              <a:schemeClr val="dk1"/>
+            </a:lnRef>
+            <a:fillRef idx="0">
+              <a:schemeClr val="dk1"/>
+            </a:fillRef>
+            <a:effectRef idx="0">
+              <a:schemeClr val="dk1"/>
+            </a:effectRef>
+            <a:fontRef idx="minor">
+              <a:schemeClr val="tx1"/>
+            </a:fontRef>
+          </p:style>
+        </p:cxnSp>
+        <p:cxnSp>
+          <p:nvCxnSpPr>
+            <p:cNvPr id="58" name="直接箭头连接符 57">
+              <a:extLst>
+                <a:ext uri="{FF2B5EF4-FFF2-40B4-BE49-F238E27FC236}">
+                  <a16:creationId xmlns:a16="http://schemas.microsoft.com/office/drawing/2014/main" id="{816C731A-0FD8-4EDE-99D3-FD27AE38B818}"/>
+                </a:ext>
+              </a:extLst>
+            </p:cNvPr>
+            <p:cNvCxnSpPr>
+              <a:cxnSpLocks/>
+              <a:stCxn id="51" idx="1"/>
+              <a:endCxn id="48" idx="3"/>
+            </p:cNvCxnSpPr>
+            <p:nvPr/>
+          </p:nvCxnSpPr>
+          <p:spPr>
+            <a:xfrm flipH="1">
+              <a:off x="9062604" y="3508196"/>
+              <a:ext cx="1022620" cy="7819"/>
+            </a:xfrm>
+            <a:prstGeom prst="straightConnector1">
+              <a:avLst/>
+            </a:prstGeom>
+            <a:ln w="19050">
+              <a:tailEnd type="triangle"/>
+            </a:ln>
+          </p:spPr>
+          <p:style>
+            <a:lnRef idx="1">
+              <a:schemeClr val="dk1"/>
+            </a:lnRef>
+            <a:fillRef idx="0">
+              <a:schemeClr val="dk1"/>
+            </a:fillRef>
+            <a:effectRef idx="0">
+              <a:schemeClr val="dk1"/>
+            </a:effectRef>
+            <a:fontRef idx="minor">
+              <a:schemeClr val="tx1"/>
+            </a:fontRef>
+          </p:style>
+        </p:cxnSp>
+        <p:cxnSp>
+          <p:nvCxnSpPr>
+            <p:cNvPr id="59" name="直接箭头连接符 58">
+              <a:extLst>
+                <a:ext uri="{FF2B5EF4-FFF2-40B4-BE49-F238E27FC236}">
+                  <a16:creationId xmlns:a16="http://schemas.microsoft.com/office/drawing/2014/main" id="{E2991A42-451A-4979-8485-E74053D6CCE8}"/>
+                </a:ext>
+              </a:extLst>
+            </p:cNvPr>
+            <p:cNvCxnSpPr>
+              <a:cxnSpLocks/>
+              <a:stCxn id="48" idx="2"/>
+              <a:endCxn id="49" idx="0"/>
+            </p:cNvCxnSpPr>
+            <p:nvPr/>
+          </p:nvCxnSpPr>
+          <p:spPr>
+            <a:xfrm>
+              <a:off x="8060220" y="3883660"/>
+              <a:ext cx="0" cy="353690"/>
+            </a:xfrm>
+            <a:prstGeom prst="straightConnector1">
+              <a:avLst/>
+            </a:prstGeom>
+            <a:ln w="19050">
+              <a:tailEnd type="triangle"/>
+            </a:ln>
+          </p:spPr>
+          <p:style>
+            <a:lnRef idx="1">
+              <a:schemeClr val="dk1"/>
+            </a:lnRef>
+            <a:fillRef idx="0">
+              <a:schemeClr val="dk1"/>
+            </a:fillRef>
+            <a:effectRef idx="0">
+              <a:schemeClr val="dk1"/>
+            </a:effectRef>
+            <a:fontRef idx="minor">
+              <a:schemeClr val="tx1"/>
+            </a:fontRef>
+          </p:style>
+        </p:cxnSp>
+        <p:cxnSp>
+          <p:nvCxnSpPr>
+            <p:cNvPr id="61" name="直接箭头连接符 60">
+              <a:extLst>
+                <a:ext uri="{FF2B5EF4-FFF2-40B4-BE49-F238E27FC236}">
+                  <a16:creationId xmlns:a16="http://schemas.microsoft.com/office/drawing/2014/main" id="{6EBA6BBF-554F-4DE0-A8E5-9047A14B6EAA}"/>
+                </a:ext>
+              </a:extLst>
+            </p:cNvPr>
+            <p:cNvCxnSpPr>
+              <a:cxnSpLocks/>
+              <a:stCxn id="49" idx="2"/>
+              <a:endCxn id="52" idx="0"/>
+            </p:cNvCxnSpPr>
+            <p:nvPr/>
+          </p:nvCxnSpPr>
+          <p:spPr>
+            <a:xfrm>
+              <a:off x="8060220" y="4972641"/>
+              <a:ext cx="3262" cy="335326"/>
+            </a:xfrm>
+            <a:prstGeom prst="straightConnector1">
+              <a:avLst/>
+            </a:prstGeom>
+            <a:ln w="19050">
+              <a:tailEnd type="triangle"/>
+            </a:ln>
+          </p:spPr>
+          <p:style>
+            <a:lnRef idx="1">
+              <a:schemeClr val="dk1"/>
+            </a:lnRef>
+            <a:fillRef idx="0">
+              <a:schemeClr val="dk1"/>
+            </a:fillRef>
+            <a:effectRef idx="0">
+              <a:schemeClr val="dk1"/>
+            </a:effectRef>
+            <a:fontRef idx="minor">
+              <a:schemeClr val="tx1"/>
+            </a:fontRef>
+          </p:style>
+        </p:cxnSp>
+        <p:cxnSp>
+          <p:nvCxnSpPr>
+            <p:cNvPr id="62" name="直接箭头连接符 61">
+              <a:extLst>
+                <a:ext uri="{FF2B5EF4-FFF2-40B4-BE49-F238E27FC236}">
+                  <a16:creationId xmlns:a16="http://schemas.microsoft.com/office/drawing/2014/main" id="{8CC05322-8368-44D2-9090-40401C687800}"/>
+                </a:ext>
+              </a:extLst>
+            </p:cNvPr>
+            <p:cNvCxnSpPr>
+              <a:cxnSpLocks/>
+              <a:stCxn id="52" idx="2"/>
+              <a:endCxn id="36" idx="0"/>
+            </p:cNvCxnSpPr>
+            <p:nvPr/>
+          </p:nvCxnSpPr>
+          <p:spPr>
+            <a:xfrm flipH="1">
+              <a:off x="8061831" y="6043258"/>
+              <a:ext cx="1651" cy="335326"/>
+            </a:xfrm>
+            <a:prstGeom prst="straightConnector1">
+              <a:avLst/>
+            </a:prstGeom>
+            <a:ln w="19050">
+              <a:tailEnd type="triangle"/>
+            </a:ln>
+          </p:spPr>
+          <p:style>
+            <a:lnRef idx="1">
+              <a:schemeClr val="dk1"/>
+            </a:lnRef>
+            <a:fillRef idx="0">
+              <a:schemeClr val="dk1"/>
+            </a:fillRef>
+            <a:effectRef idx="0">
+              <a:schemeClr val="dk1"/>
+            </a:effectRef>
+            <a:fontRef idx="minor">
+              <a:schemeClr val="tx1"/>
+            </a:fontRef>
+          </p:style>
+        </p:cxnSp>
+        <p:sp>
+          <p:nvSpPr>
+            <p:cNvPr id="70" name="矩形 69">
+              <a:extLst>
+                <a:ext uri="{FF2B5EF4-FFF2-40B4-BE49-F238E27FC236}">
+                  <a16:creationId xmlns:a16="http://schemas.microsoft.com/office/drawing/2014/main" id="{74F09F2D-F9D5-4CD8-9123-254ACF8E98EB}"/>
+                </a:ext>
+              </a:extLst>
+            </p:cNvPr>
+            <p:cNvSpPr/>
+            <p:nvPr/>
+          </p:nvSpPr>
+          <p:spPr>
+            <a:xfrm>
+              <a:off x="7040625" y="7311833"/>
+              <a:ext cx="2045713" cy="622166"/>
+            </a:xfrm>
+            <a:prstGeom prst="rect">
+              <a:avLst/>
+            </a:prstGeom>
+            <a:noFill/>
+            <a:ln w="28575">
+              <a:solidFill>
+                <a:schemeClr val="tx1"/>
+              </a:solidFill>
+            </a:ln>
+          </p:spPr>
+          <p:style>
+            <a:lnRef idx="2">
+              <a:schemeClr val="accent1">
+                <a:shade val="50000"/>
+              </a:schemeClr>
+            </a:lnRef>
+            <a:fillRef idx="1">
+              <a:schemeClr val="accent1"/>
+            </a:fillRef>
+            <a:effectRef idx="0">
+              <a:schemeClr val="accent1"/>
+            </a:effectRef>
+            <a:fontRef idx="minor">
+              <a:schemeClr val="lt1"/>
+            </a:fontRef>
+          </p:style>
+          <p:txBody>
+            <a:bodyPr rtlCol="0" anchor="ctr"/>
+            <a:lstStyle/>
+            <a:p>
+              <a:pPr algn="ctr"/>
+              <a:r>
+                <a:rPr lang="zh-CN" altLang="en-US" dirty="0">
+                  <a:ln w="3175">
+                    <a:solidFill>
+                      <a:schemeClr val="tx1"/>
+                    </a:solidFill>
+                  </a:ln>
+                  <a:solidFill>
+                    <a:schemeClr val="tx1"/>
+                  </a:solidFill>
+                  <a:latin typeface="宋体" panose="02010600030101010101" pitchFamily="2" charset="-122"/>
+                  <a:ea typeface="宋体" panose="02010600030101010101" pitchFamily="2" charset="-122"/>
+                </a:rPr>
+                <a:t>显示匹配后的直方图和匹配后的图像</a:t>
+              </a:r>
+            </a:p>
+          </p:txBody>
+        </p:sp>
+        <p:cxnSp>
+          <p:nvCxnSpPr>
+            <p:cNvPr id="72" name="直接箭头连接符 71">
+              <a:extLst>
+                <a:ext uri="{FF2B5EF4-FFF2-40B4-BE49-F238E27FC236}">
+                  <a16:creationId xmlns:a16="http://schemas.microsoft.com/office/drawing/2014/main" id="{ECD92E2D-A656-4229-A9EE-F49E6D8D0DA6}"/>
+                </a:ext>
+              </a:extLst>
+            </p:cNvPr>
+            <p:cNvCxnSpPr>
+              <a:cxnSpLocks/>
+              <a:stCxn id="70" idx="2"/>
+            </p:cNvCxnSpPr>
+            <p:nvPr/>
+          </p:nvCxnSpPr>
+          <p:spPr>
+            <a:xfrm flipH="1">
+              <a:off x="8062005" y="7933999"/>
+              <a:ext cx="1477" cy="241423"/>
+            </a:xfrm>
+            <a:prstGeom prst="straightConnector1">
+              <a:avLst/>
+            </a:prstGeom>
+            <a:ln w="19050">
+              <a:tailEnd type="triangle"/>
+            </a:ln>
+          </p:spPr>
+          <p:style>
+            <a:lnRef idx="1">
+              <a:schemeClr val="dk1"/>
+            </a:lnRef>
+            <a:fillRef idx="0">
+              <a:schemeClr val="dk1"/>
+            </a:fillRef>
+            <a:effectRef idx="0">
+              <a:schemeClr val="dk1"/>
+            </a:effectRef>
+            <a:fontRef idx="minor">
+              <a:schemeClr val="tx1"/>
+            </a:fontRef>
+          </p:style>
+        </p:cxnSp>
+      </p:grpSp>
     </p:spTree>
     <p:extLst>
       <p:ext uri="{BB962C8B-B14F-4D97-AF65-F5344CB8AC3E}">

</xml_diff>